<commit_message>
updated graphs and powerpoint
</commit_message>
<xml_diff>
--- a/Concussions in the NFL.pptx
+++ b/Concussions in the NFL.pptx
@@ -12,9 +12,12 @@
     <p:sldId id="260" r:id="rId6"/>
     <p:sldId id="261" r:id="rId7"/>
     <p:sldId id="262" r:id="rId8"/>
-    <p:sldId id="263" r:id="rId9"/>
-    <p:sldId id="264" r:id="rId10"/>
-    <p:sldId id="265" r:id="rId11"/>
+    <p:sldId id="266" r:id="rId9"/>
+    <p:sldId id="267" r:id="rId10"/>
+    <p:sldId id="268" r:id="rId11"/>
+    <p:sldId id="263" r:id="rId12"/>
+    <p:sldId id="264" r:id="rId13"/>
+    <p:sldId id="265" r:id="rId14"/>
   </p:sldIdLst>
   <p:sldSz cx="12192000" cy="6858000"/>
   <p:notesSz cx="6858000" cy="9144000"/>
@@ -280,7 +283,7 @@
           <a:p>
             <a:fld id="{17BDACBA-FEFB-4B09-B122-B726D4C1B49C}" type="datetimeFigureOut">
               <a:rPr lang="en-US" smtClean="0"/>
-              <a:t>10/26/2020</a:t>
+              <a:t>10/26/20</a:t>
             </a:fld>
             <a:endParaRPr lang="en-US" dirty="0"/>
           </a:p>
@@ -478,7 +481,7 @@
           <a:p>
             <a:fld id="{17BDACBA-FEFB-4B09-B122-B726D4C1B49C}" type="datetimeFigureOut">
               <a:rPr lang="en-US" smtClean="0"/>
-              <a:t>10/26/2020</a:t>
+              <a:t>10/26/20</a:t>
             </a:fld>
             <a:endParaRPr lang="en-US" dirty="0"/>
           </a:p>
@@ -686,7 +689,7 @@
           <a:p>
             <a:fld id="{17BDACBA-FEFB-4B09-B122-B726D4C1B49C}" type="datetimeFigureOut">
               <a:rPr lang="en-US" smtClean="0"/>
-              <a:t>10/26/2020</a:t>
+              <a:t>10/26/20</a:t>
             </a:fld>
             <a:endParaRPr lang="en-US" dirty="0"/>
           </a:p>
@@ -884,7 +887,7 @@
           <a:p>
             <a:fld id="{17BDACBA-FEFB-4B09-B122-B726D4C1B49C}" type="datetimeFigureOut">
               <a:rPr lang="en-US" smtClean="0"/>
-              <a:t>10/26/2020</a:t>
+              <a:t>10/26/20</a:t>
             </a:fld>
             <a:endParaRPr lang="en-US" dirty="0"/>
           </a:p>
@@ -1159,7 +1162,7 @@
           <a:p>
             <a:fld id="{17BDACBA-FEFB-4B09-B122-B726D4C1B49C}" type="datetimeFigureOut">
               <a:rPr lang="en-US" smtClean="0"/>
-              <a:t>10/26/2020</a:t>
+              <a:t>10/26/20</a:t>
             </a:fld>
             <a:endParaRPr lang="en-US" dirty="0"/>
           </a:p>
@@ -1424,7 +1427,7 @@
           <a:p>
             <a:fld id="{17BDACBA-FEFB-4B09-B122-B726D4C1B49C}" type="datetimeFigureOut">
               <a:rPr lang="en-US" smtClean="0"/>
-              <a:t>10/26/2020</a:t>
+              <a:t>10/26/20</a:t>
             </a:fld>
             <a:endParaRPr lang="en-US" dirty="0"/>
           </a:p>
@@ -1836,7 +1839,7 @@
           <a:p>
             <a:fld id="{17BDACBA-FEFB-4B09-B122-B726D4C1B49C}" type="datetimeFigureOut">
               <a:rPr lang="en-US" smtClean="0"/>
-              <a:t>10/26/2020</a:t>
+              <a:t>10/26/20</a:t>
             </a:fld>
             <a:endParaRPr lang="en-US" dirty="0"/>
           </a:p>
@@ -1977,7 +1980,7 @@
           <a:p>
             <a:fld id="{17BDACBA-FEFB-4B09-B122-B726D4C1B49C}" type="datetimeFigureOut">
               <a:rPr lang="en-US" smtClean="0"/>
-              <a:t>10/26/2020</a:t>
+              <a:t>10/26/20</a:t>
             </a:fld>
             <a:endParaRPr lang="en-US" dirty="0"/>
           </a:p>
@@ -2090,7 +2093,7 @@
           <a:p>
             <a:fld id="{17BDACBA-FEFB-4B09-B122-B726D4C1B49C}" type="datetimeFigureOut">
               <a:rPr lang="en-US" smtClean="0"/>
-              <a:t>10/26/2020</a:t>
+              <a:t>10/26/20</a:t>
             </a:fld>
             <a:endParaRPr lang="en-US" dirty="0"/>
           </a:p>
@@ -2401,7 +2404,7 @@
           <a:p>
             <a:fld id="{17BDACBA-FEFB-4B09-B122-B726D4C1B49C}" type="datetimeFigureOut">
               <a:rPr lang="en-US" smtClean="0"/>
-              <a:t>10/26/2020</a:t>
+              <a:t>10/26/20</a:t>
             </a:fld>
             <a:endParaRPr lang="en-US" dirty="0"/>
           </a:p>
@@ -2689,7 +2692,7 @@
           <a:p>
             <a:fld id="{17BDACBA-FEFB-4B09-B122-B726D4C1B49C}" type="datetimeFigureOut">
               <a:rPr lang="en-US" smtClean="0"/>
-              <a:t>10/26/2020</a:t>
+              <a:t>10/26/20</a:t>
             </a:fld>
             <a:endParaRPr lang="en-US" dirty="0"/>
           </a:p>
@@ -2930,7 +2933,7 @@
           <a:p>
             <a:fld id="{17BDACBA-FEFB-4B09-B122-B726D4C1B49C}" type="datetimeFigureOut">
               <a:rPr lang="en-US" smtClean="0"/>
-              <a:t>10/26/2020</a:t>
+              <a:t>10/26/20</a:t>
             </a:fld>
             <a:endParaRPr lang="en-US" dirty="0"/>
           </a:p>
@@ -3746,6 +3749,934 @@
           <p:cNvPr id="2" name="Title 1">
             <a:extLst>
               <a:ext uri="{FF2B5EF4-FFF2-40B4-BE49-F238E27FC236}">
+                <a16:creationId xmlns:a16="http://schemas.microsoft.com/office/drawing/2014/main" id="{23F221A8-1670-4451-9180-D4F98B496DDB}"/>
+              </a:ext>
+            </a:extLst>
+          </p:cNvPr>
+          <p:cNvSpPr>
+            <a:spLocks noGrp="1"/>
+          </p:cNvSpPr>
+          <p:nvPr>
+            <p:ph type="title"/>
+          </p:nvPr>
+        </p:nvSpPr>
+        <p:spPr>
+          <a:xfrm>
+            <a:off x="1179226" y="826680"/>
+            <a:ext cx="9833548" cy="1325563"/>
+          </a:xfrm>
+        </p:spPr>
+        <p:txBody>
+          <a:bodyPr>
+            <a:normAutofit/>
+          </a:bodyPr>
+          <a:lstStyle/>
+          <a:p>
+            <a:pPr marR="0" lvl="0" algn="ctr" defTabSz="914400" rtl="0" eaLnBrk="1" fontAlgn="auto" latinLnBrk="0" hangingPunct="1">
+              <a:lnSpc>
+                <a:spcPct val="90000"/>
+              </a:lnSpc>
+              <a:spcBef>
+                <a:spcPts val="1000"/>
+              </a:spcBef>
+              <a:spcAft>
+                <a:spcPts val="0"/>
+              </a:spcAft>
+              <a:buClrTx/>
+              <a:buSzTx/>
+              <a:tabLst/>
+              <a:defRPr/>
+            </a:pPr>
+            <a:r>
+              <a:rPr lang="en-US" sz="4000" dirty="0">
+                <a:solidFill>
+                  <a:srgbClr val="FFFFFF"/>
+                </a:solidFill>
+              </a:rPr>
+              <a:t>Question 2</a:t>
+            </a:r>
+          </a:p>
+        </p:txBody>
+      </p:sp>
+      <p:sp>
+        <p:nvSpPr>
+          <p:cNvPr id="6" name="TextBox 5">
+            <a:extLst>
+              <a:ext uri="{FF2B5EF4-FFF2-40B4-BE49-F238E27FC236}">
+                <a16:creationId xmlns:a16="http://schemas.microsoft.com/office/drawing/2014/main" id="{050CA433-B61A-114E-A358-EE5D2F4032AF}"/>
+              </a:ext>
+            </a:extLst>
+          </p:cNvPr>
+          <p:cNvSpPr txBox="1"/>
+          <p:nvPr/>
+        </p:nvSpPr>
+        <p:spPr>
+          <a:xfrm>
+            <a:off x="1085222" y="3265714"/>
+            <a:ext cx="4461468" cy="1754326"/>
+          </a:xfrm>
+          <a:prstGeom prst="rect">
+            <a:avLst/>
+          </a:prstGeom>
+          <a:noFill/>
+        </p:spPr>
+        <p:txBody>
+          <a:bodyPr wrap="square" rtlCol="0">
+            <a:spAutoFit/>
+          </a:bodyPr>
+          <a:lstStyle/>
+          <a:p>
+            <a:pPr marL="285750" indent="-285750">
+              <a:buFont typeface="Arial" panose="020B0604020202020204" pitchFamily="34" charset="0"/>
+              <a:buChar char="•"/>
+            </a:pPr>
+            <a:r>
+              <a:rPr lang="en-US" dirty="0"/>
+              <a:t>Concussions went down in 2018 compared to the recent two years once new targeting rules were implemented</a:t>
+            </a:r>
+          </a:p>
+          <a:p>
+            <a:pPr marL="285750" indent="-285750">
+              <a:buFont typeface="Arial" panose="020B0604020202020204" pitchFamily="34" charset="0"/>
+              <a:buChar char="•"/>
+            </a:pPr>
+            <a:endParaRPr lang="en-US" dirty="0"/>
+          </a:p>
+          <a:p>
+            <a:pPr marL="285750" indent="-285750">
+              <a:buFont typeface="Arial" panose="020B0604020202020204" pitchFamily="34" charset="0"/>
+              <a:buChar char="•"/>
+            </a:pPr>
+            <a:r>
+              <a:rPr lang="en-US" dirty="0"/>
+              <a:t>T-test: -0.618379</a:t>
+            </a:r>
+          </a:p>
+          <a:p>
+            <a:pPr marL="285750" indent="-285750">
+              <a:buFont typeface="Arial" panose="020B0604020202020204" pitchFamily="34" charset="0"/>
+              <a:buChar char="•"/>
+            </a:pPr>
+            <a:r>
+              <a:rPr lang="en-US" dirty="0" err="1"/>
+              <a:t>Pvalue</a:t>
+            </a:r>
+            <a:r>
+              <a:rPr lang="en-US" dirty="0"/>
+              <a:t>: 0.56340387</a:t>
+            </a:r>
+          </a:p>
+        </p:txBody>
+      </p:sp>
+      <p:pic>
+        <p:nvPicPr>
+          <p:cNvPr id="14" name="Content Placeholder 13">
+            <a:extLst>
+              <a:ext uri="{FF2B5EF4-FFF2-40B4-BE49-F238E27FC236}">
+                <a16:creationId xmlns:a16="http://schemas.microsoft.com/office/drawing/2014/main" id="{D9A83CB2-C7E1-F949-98BD-E8E46B2414E6}"/>
+              </a:ext>
+            </a:extLst>
+          </p:cNvPr>
+          <p:cNvPicPr>
+            <a:picLocks noGrp="1" noChangeAspect="1"/>
+          </p:cNvPicPr>
+          <p:nvPr>
+            <p:ph idx="1"/>
+          </p:nvPr>
+        </p:nvPicPr>
+        <p:blipFill>
+          <a:blip r:embed="rId3">
+            <a:extLst>
+              <a:ext uri="{28A0092B-C50C-407E-A947-70E740481C1C}">
+                <a14:useLocalDpi xmlns:a14="http://schemas.microsoft.com/office/drawing/2010/main" val="0"/>
+              </a:ext>
+            </a:extLst>
+          </a:blip>
+          <a:stretch>
+            <a:fillRect/>
+          </a:stretch>
+        </p:blipFill>
+        <p:spPr>
+          <a:xfrm>
+            <a:off x="6095848" y="2977168"/>
+            <a:ext cx="5486400" cy="3657600"/>
+          </a:xfrm>
+        </p:spPr>
+      </p:pic>
+    </p:spTree>
+    <p:extLst>
+      <p:ext uri="{BB962C8B-B14F-4D97-AF65-F5344CB8AC3E}">
+        <p14:creationId xmlns:p14="http://schemas.microsoft.com/office/powerpoint/2010/main" val="39522343"/>
+      </p:ext>
+    </p:extLst>
+  </p:cSld>
+  <p:clrMapOvr>
+    <a:masterClrMapping/>
+  </p:clrMapOvr>
+</p:sld>
+</file>
+
+<file path=ppt/slides/slide11.xml><?xml version="1.0" encoding="utf-8"?>
+<p:sld xmlns:a="http://schemas.openxmlformats.org/drawingml/2006/main" xmlns:r="http://schemas.openxmlformats.org/officeDocument/2006/relationships" xmlns:p="http://schemas.openxmlformats.org/presentationml/2006/main">
+  <p:cSld>
+    <p:bg>
+      <p:bgPr>
+        <a:solidFill>
+          <a:schemeClr val="bg1"/>
+        </a:solidFill>
+        <a:effectLst/>
+      </p:bgPr>
+    </p:bg>
+    <p:spTree>
+      <p:nvGrpSpPr>
+        <p:cNvPr id="1" name=""/>
+        <p:cNvGrpSpPr/>
+        <p:nvPr/>
+      </p:nvGrpSpPr>
+      <p:grpSpPr>
+        <a:xfrm>
+          <a:off x="0" y="0"/>
+          <a:ext cx="0" cy="0"/>
+          <a:chOff x="0" y="0"/>
+          <a:chExt cx="0" cy="0"/>
+        </a:xfrm>
+      </p:grpSpPr>
+      <p:sp>
+        <p:nvSpPr>
+          <p:cNvPr id="8" name="Rectangle 7">
+            <a:extLst>
+              <a:ext uri="{FF2B5EF4-FFF2-40B4-BE49-F238E27FC236}">
+                <a16:creationId xmlns:a16="http://schemas.microsoft.com/office/drawing/2014/main" id="{4351DFE5-F63D-4BE0-BDA9-E3EB88F01AA5}"/>
+              </a:ext>
+              <a:ext uri="{C183D7F6-B498-43B3-948B-1728B52AA6E4}">
+                <adec:decorative xmlns:adec="http://schemas.microsoft.com/office/drawing/2017/decorative" val="1"/>
+              </a:ext>
+            </a:extLst>
+          </p:cNvPr>
+          <p:cNvSpPr>
+            <a:spLocks noGrp="1" noRot="1" noChangeAspect="1" noMove="1" noResize="1" noEditPoints="1" noAdjustHandles="1" noChangeArrowheads="1" noChangeShapeType="1" noTextEdit="1"/>
+          </p:cNvSpPr>
+          <p:nvPr>
+            <p:extLst>
+              <p:ext uri="{386F3935-93C4-4BCD-93E2-E3B085C9AB24}">
+                <p16:designElem xmlns:p16="http://schemas.microsoft.com/office/powerpoint/2015/main" val="1"/>
+              </p:ext>
+            </p:extLst>
+          </p:nvPr>
+        </p:nvSpPr>
+        <p:spPr>
+          <a:xfrm>
+            <a:off x="355601" y="0"/>
+            <a:ext cx="11480494" cy="2753936"/>
+          </a:xfrm>
+          <a:prstGeom prst="rect">
+            <a:avLst/>
+          </a:prstGeom>
+          <a:gradFill>
+            <a:gsLst>
+              <a:gs pos="0">
+                <a:schemeClr val="accent1">
+                  <a:lumMod val="90000"/>
+                </a:schemeClr>
+              </a:gs>
+              <a:gs pos="25000">
+                <a:schemeClr val="accent1">
+                  <a:lumMod val="90000"/>
+                </a:schemeClr>
+              </a:gs>
+              <a:gs pos="94000">
+                <a:schemeClr val="bg2">
+                  <a:lumMod val="25000"/>
+                </a:schemeClr>
+              </a:gs>
+              <a:gs pos="100000">
+                <a:schemeClr val="bg2">
+                  <a:lumMod val="25000"/>
+                </a:schemeClr>
+              </a:gs>
+            </a:gsLst>
+            <a:lin ang="4200000" scaled="0"/>
+          </a:gradFill>
+          <a:ln>
+            <a:noFill/>
+          </a:ln>
+        </p:spPr>
+        <p:style>
+          <a:lnRef idx="2">
+            <a:schemeClr val="accent1">
+              <a:shade val="50000"/>
+            </a:schemeClr>
+          </a:lnRef>
+          <a:fillRef idx="1">
+            <a:schemeClr val="accent1"/>
+          </a:fillRef>
+          <a:effectRef idx="0">
+            <a:schemeClr val="accent1"/>
+          </a:effectRef>
+          <a:fontRef idx="minor">
+            <a:schemeClr val="lt1"/>
+          </a:fontRef>
+        </p:style>
+        <p:txBody>
+          <a:bodyPr rtlCol="0" anchor="ctr"/>
+          <a:lstStyle/>
+          <a:p>
+            <a:pPr algn="ctr"/>
+            <a:endParaRPr lang="en-US"/>
+          </a:p>
+        </p:txBody>
+      </p:sp>
+      <p:pic>
+        <p:nvPicPr>
+          <p:cNvPr id="10" name="Picture 9">
+            <a:extLst>
+              <a:ext uri="{FF2B5EF4-FFF2-40B4-BE49-F238E27FC236}">
+                <a16:creationId xmlns:a16="http://schemas.microsoft.com/office/drawing/2014/main" id="{3AA16612-ACD2-4A16-8F2B-4514FD6BF28F}"/>
+              </a:ext>
+              <a:ext uri="{C183D7F6-B498-43B3-948B-1728B52AA6E4}">
+                <adec:decorative xmlns:adec="http://schemas.microsoft.com/office/drawing/2017/decorative" val="1"/>
+              </a:ext>
+            </a:extLst>
+          </p:cNvPr>
+          <p:cNvPicPr>
+            <a:picLocks noGrp="1" noRot="1" noChangeAspect="1" noMove="1" noResize="1" noEditPoints="1" noAdjustHandles="1" noChangeArrowheads="1" noChangeShapeType="1" noCrop="1"/>
+          </p:cNvPicPr>
+          <p:nvPr>
+            <p:extLst>
+              <p:ext uri="{386F3935-93C4-4BCD-93E2-E3B085C9AB24}">
+                <p16:designElem xmlns:p16="http://schemas.microsoft.com/office/powerpoint/2015/main" val="1"/>
+              </p:ext>
+            </p:extLst>
+          </p:nvPr>
+        </p:nvPicPr>
+        <p:blipFill>
+          <a:blip r:embed="rId2">
+            <a:extLst>
+              <a:ext uri="{28A0092B-C50C-407E-A947-70E740481C1C}">
+                <a14:useLocalDpi xmlns:a14="http://schemas.microsoft.com/office/drawing/2010/main" val="0"/>
+              </a:ext>
+            </a:extLst>
+          </a:blip>
+          <a:stretch>
+            <a:fillRect/>
+          </a:stretch>
+        </p:blipFill>
+        <p:spPr>
+          <a:xfrm>
+            <a:off x="0" y="0"/>
+            <a:ext cx="12192000" cy="6858000"/>
+          </a:xfrm>
+          <a:prstGeom prst="rect">
+            <a:avLst/>
+          </a:prstGeom>
+        </p:spPr>
+      </p:pic>
+      <p:sp>
+        <p:nvSpPr>
+          <p:cNvPr id="2" name="Title 1">
+            <a:extLst>
+              <a:ext uri="{FF2B5EF4-FFF2-40B4-BE49-F238E27FC236}">
+                <a16:creationId xmlns:a16="http://schemas.microsoft.com/office/drawing/2014/main" id="{23F221A8-1670-4451-9180-D4F98B496DDB}"/>
+              </a:ext>
+            </a:extLst>
+          </p:cNvPr>
+          <p:cNvSpPr>
+            <a:spLocks noGrp="1"/>
+          </p:cNvSpPr>
+          <p:nvPr>
+            <p:ph type="title"/>
+          </p:nvPr>
+        </p:nvSpPr>
+        <p:spPr>
+          <a:xfrm>
+            <a:off x="1179226" y="826680"/>
+            <a:ext cx="9833548" cy="1325563"/>
+          </a:xfrm>
+        </p:spPr>
+        <p:txBody>
+          <a:bodyPr>
+            <a:normAutofit/>
+          </a:bodyPr>
+          <a:lstStyle/>
+          <a:p>
+            <a:pPr marR="0" lvl="0" algn="ctr" defTabSz="914400" rtl="0" eaLnBrk="1" fontAlgn="auto" latinLnBrk="0" hangingPunct="1">
+              <a:lnSpc>
+                <a:spcPct val="90000"/>
+              </a:lnSpc>
+              <a:spcBef>
+                <a:spcPts val="1000"/>
+              </a:spcBef>
+              <a:spcAft>
+                <a:spcPts val="0"/>
+              </a:spcAft>
+              <a:buClrTx/>
+              <a:buSzTx/>
+              <a:tabLst/>
+              <a:defRPr/>
+            </a:pPr>
+            <a:r>
+              <a:rPr lang="en-US" sz="4000" dirty="0">
+                <a:solidFill>
+                  <a:srgbClr val="FFFFFF"/>
+                </a:solidFill>
+              </a:rPr>
+              <a:t>Question 3</a:t>
+            </a:r>
+          </a:p>
+        </p:txBody>
+      </p:sp>
+      <p:sp>
+        <p:nvSpPr>
+          <p:cNvPr id="3" name="Content Placeholder 2">
+            <a:extLst>
+              <a:ext uri="{FF2B5EF4-FFF2-40B4-BE49-F238E27FC236}">
+                <a16:creationId xmlns:a16="http://schemas.microsoft.com/office/drawing/2014/main" id="{3AA4323E-B417-4B90-B96E-9BC5A62356DD}"/>
+              </a:ext>
+            </a:extLst>
+          </p:cNvPr>
+          <p:cNvSpPr>
+            <a:spLocks noGrp="1"/>
+          </p:cNvSpPr>
+          <p:nvPr>
+            <p:ph idx="1"/>
+          </p:nvPr>
+        </p:nvSpPr>
+        <p:spPr>
+          <a:xfrm>
+            <a:off x="1179226" y="3092970"/>
+            <a:ext cx="9833548" cy="2693976"/>
+          </a:xfrm>
+        </p:spPr>
+        <p:txBody>
+          <a:bodyPr>
+            <a:normAutofit/>
+          </a:bodyPr>
+          <a:lstStyle/>
+          <a:p>
+            <a:r>
+              <a:rPr lang="en-US" sz="2000" b="0" i="0" dirty="0">
+                <a:solidFill>
+                  <a:srgbClr val="24292E"/>
+                </a:solidFill>
+                <a:effectLst/>
+                <a:latin typeface="-apple-system"/>
+              </a:rPr>
+              <a:t>Is there a certain time of year that has more concussions occur?</a:t>
+            </a:r>
+          </a:p>
+          <a:p>
+            <a:pPr algn="l">
+              <a:buFont typeface="Arial" panose="020B0604020202020204" pitchFamily="34" charset="0"/>
+              <a:buChar char="•"/>
+            </a:pPr>
+            <a:r>
+              <a:rPr lang="en-US" sz="2000" b="0" i="0" dirty="0">
+                <a:solidFill>
+                  <a:srgbClr val="24292E"/>
+                </a:solidFill>
+                <a:effectLst/>
+                <a:latin typeface="-apple-system"/>
+              </a:rPr>
+              <a:t>Alt: If the time of year affects concussions, then there will be more concussions during a certain part of the season.</a:t>
+            </a:r>
+          </a:p>
+          <a:p>
+            <a:pPr algn="l">
+              <a:buFont typeface="Arial" panose="020B0604020202020204" pitchFamily="34" charset="0"/>
+              <a:buChar char="•"/>
+            </a:pPr>
+            <a:r>
+              <a:rPr lang="en-US" sz="2000" b="0" i="0" dirty="0">
+                <a:solidFill>
+                  <a:srgbClr val="24292E"/>
+                </a:solidFill>
+                <a:effectLst/>
+                <a:latin typeface="-apple-system"/>
+              </a:rPr>
+              <a:t>Null: If the time of year does not affect concussions, then there will not be more concussions during a certain part of the season.</a:t>
+            </a:r>
+          </a:p>
+          <a:p>
+            <a:pPr algn="l">
+              <a:buFont typeface="Arial" panose="020B0604020202020204" pitchFamily="34" charset="0"/>
+              <a:buChar char="•"/>
+            </a:pPr>
+            <a:r>
+              <a:rPr lang="en-US" sz="2000" dirty="0">
+                <a:solidFill>
+                  <a:srgbClr val="24292E"/>
+                </a:solidFill>
+                <a:latin typeface="-apple-system"/>
+              </a:rPr>
+              <a:t>T Test=  3.215721636354374</a:t>
+            </a:r>
+          </a:p>
+          <a:p>
+            <a:pPr algn="l">
+              <a:buFont typeface="Arial" panose="020B0604020202020204" pitchFamily="34" charset="0"/>
+              <a:buChar char="•"/>
+            </a:pPr>
+            <a:r>
+              <a:rPr lang="en-US" sz="2000" b="0" i="0" dirty="0" err="1">
+                <a:solidFill>
+                  <a:srgbClr val="24292E"/>
+                </a:solidFill>
+                <a:effectLst/>
+                <a:latin typeface="-apple-system"/>
+              </a:rPr>
+              <a:t>Pvalue</a:t>
+            </a:r>
+            <a:r>
+              <a:rPr lang="en-US" sz="2000" b="0" i="0" dirty="0">
+                <a:solidFill>
+                  <a:srgbClr val="24292E"/>
+                </a:solidFill>
+                <a:effectLst/>
+                <a:latin typeface="-apple-system"/>
+              </a:rPr>
+              <a:t>= 0.00019897702695319134</a:t>
+            </a:r>
+          </a:p>
+          <a:p>
+            <a:pPr marL="0" indent="0">
+              <a:buNone/>
+            </a:pPr>
+            <a:endParaRPr lang="en-US" sz="2000" dirty="0">
+              <a:solidFill>
+                <a:srgbClr val="000000"/>
+              </a:solidFill>
+            </a:endParaRPr>
+          </a:p>
+        </p:txBody>
+      </p:sp>
+    </p:spTree>
+    <p:extLst>
+      <p:ext uri="{BB962C8B-B14F-4D97-AF65-F5344CB8AC3E}">
+        <p14:creationId xmlns:p14="http://schemas.microsoft.com/office/powerpoint/2010/main" val="2152812155"/>
+      </p:ext>
+    </p:extLst>
+  </p:cSld>
+  <p:clrMapOvr>
+    <a:masterClrMapping/>
+  </p:clrMapOvr>
+</p:sld>
+</file>
+
+<file path=ppt/slides/slide12.xml><?xml version="1.0" encoding="utf-8"?>
+<p:sld xmlns:a="http://schemas.openxmlformats.org/drawingml/2006/main" xmlns:r="http://schemas.openxmlformats.org/officeDocument/2006/relationships" xmlns:p="http://schemas.openxmlformats.org/presentationml/2006/main">
+  <p:cSld>
+    <p:bg>
+      <p:bgPr>
+        <a:solidFill>
+          <a:schemeClr val="bg1"/>
+        </a:solidFill>
+        <a:effectLst/>
+      </p:bgPr>
+    </p:bg>
+    <p:spTree>
+      <p:nvGrpSpPr>
+        <p:cNvPr id="1" name=""/>
+        <p:cNvGrpSpPr/>
+        <p:nvPr/>
+      </p:nvGrpSpPr>
+      <p:grpSpPr>
+        <a:xfrm>
+          <a:off x="0" y="0"/>
+          <a:ext cx="0" cy="0"/>
+          <a:chOff x="0" y="0"/>
+          <a:chExt cx="0" cy="0"/>
+        </a:xfrm>
+      </p:grpSpPr>
+      <p:sp>
+        <p:nvSpPr>
+          <p:cNvPr id="17" name="Rectangle 16">
+            <a:extLst>
+              <a:ext uri="{FF2B5EF4-FFF2-40B4-BE49-F238E27FC236}">
+                <a16:creationId xmlns:a16="http://schemas.microsoft.com/office/drawing/2014/main" id="{4351DFE5-F63D-4BE0-BDA9-E3EB88F01AA5}"/>
+              </a:ext>
+              <a:ext uri="{C183D7F6-B498-43B3-948B-1728B52AA6E4}">
+                <adec:decorative xmlns:adec="http://schemas.microsoft.com/office/drawing/2017/decorative" val="1"/>
+              </a:ext>
+            </a:extLst>
+          </p:cNvPr>
+          <p:cNvSpPr>
+            <a:spLocks noGrp="1" noRot="1" noChangeAspect="1" noMove="1" noResize="1" noEditPoints="1" noAdjustHandles="1" noChangeArrowheads="1" noChangeShapeType="1" noTextEdit="1"/>
+          </p:cNvSpPr>
+          <p:nvPr>
+            <p:extLst>
+              <p:ext uri="{386F3935-93C4-4BCD-93E2-E3B085C9AB24}">
+                <p16:designElem xmlns:p16="http://schemas.microsoft.com/office/powerpoint/2015/main" val="1"/>
+              </p:ext>
+            </p:extLst>
+          </p:nvPr>
+        </p:nvSpPr>
+        <p:spPr>
+          <a:xfrm>
+            <a:off x="355601" y="0"/>
+            <a:ext cx="11480494" cy="2753936"/>
+          </a:xfrm>
+          <a:prstGeom prst="rect">
+            <a:avLst/>
+          </a:prstGeom>
+          <a:gradFill>
+            <a:gsLst>
+              <a:gs pos="0">
+                <a:schemeClr val="accent1">
+                  <a:lumMod val="90000"/>
+                </a:schemeClr>
+              </a:gs>
+              <a:gs pos="25000">
+                <a:schemeClr val="accent1">
+                  <a:lumMod val="90000"/>
+                </a:schemeClr>
+              </a:gs>
+              <a:gs pos="94000">
+                <a:schemeClr val="bg2">
+                  <a:lumMod val="25000"/>
+                </a:schemeClr>
+              </a:gs>
+              <a:gs pos="100000">
+                <a:schemeClr val="bg2">
+                  <a:lumMod val="25000"/>
+                </a:schemeClr>
+              </a:gs>
+            </a:gsLst>
+            <a:lin ang="4200000" scaled="0"/>
+          </a:gradFill>
+          <a:ln>
+            <a:noFill/>
+          </a:ln>
+        </p:spPr>
+        <p:style>
+          <a:lnRef idx="2">
+            <a:schemeClr val="accent1">
+              <a:shade val="50000"/>
+            </a:schemeClr>
+          </a:lnRef>
+          <a:fillRef idx="1">
+            <a:schemeClr val="accent1"/>
+          </a:fillRef>
+          <a:effectRef idx="0">
+            <a:schemeClr val="accent1"/>
+          </a:effectRef>
+          <a:fontRef idx="minor">
+            <a:schemeClr val="lt1"/>
+          </a:fontRef>
+        </p:style>
+        <p:txBody>
+          <a:bodyPr rtlCol="0" anchor="ctr"/>
+          <a:lstStyle/>
+          <a:p>
+            <a:pPr algn="ctr"/>
+            <a:endParaRPr lang="en-US"/>
+          </a:p>
+        </p:txBody>
+      </p:sp>
+      <p:pic>
+        <p:nvPicPr>
+          <p:cNvPr id="19" name="Picture 18">
+            <a:extLst>
+              <a:ext uri="{FF2B5EF4-FFF2-40B4-BE49-F238E27FC236}">
+                <a16:creationId xmlns:a16="http://schemas.microsoft.com/office/drawing/2014/main" id="{3AA16612-ACD2-4A16-8F2B-4514FD6BF28F}"/>
+              </a:ext>
+              <a:ext uri="{C183D7F6-B498-43B3-948B-1728B52AA6E4}">
+                <adec:decorative xmlns:adec="http://schemas.microsoft.com/office/drawing/2017/decorative" val="1"/>
+              </a:ext>
+            </a:extLst>
+          </p:cNvPr>
+          <p:cNvPicPr>
+            <a:picLocks noGrp="1" noRot="1" noChangeAspect="1" noMove="1" noResize="1" noEditPoints="1" noAdjustHandles="1" noChangeArrowheads="1" noChangeShapeType="1" noCrop="1"/>
+          </p:cNvPicPr>
+          <p:nvPr>
+            <p:extLst>
+              <p:ext uri="{386F3935-93C4-4BCD-93E2-E3B085C9AB24}">
+                <p16:designElem xmlns:p16="http://schemas.microsoft.com/office/powerpoint/2015/main" val="1"/>
+              </p:ext>
+            </p:extLst>
+          </p:nvPr>
+        </p:nvPicPr>
+        <p:blipFill>
+          <a:blip r:embed="rId2">
+            <a:extLst>
+              <a:ext uri="{28A0092B-C50C-407E-A947-70E740481C1C}">
+                <a14:useLocalDpi xmlns:a14="http://schemas.microsoft.com/office/drawing/2010/main" val="0"/>
+              </a:ext>
+            </a:extLst>
+          </a:blip>
+          <a:stretch>
+            <a:fillRect/>
+          </a:stretch>
+        </p:blipFill>
+        <p:spPr>
+          <a:xfrm>
+            <a:off x="0" y="0"/>
+            <a:ext cx="12192000" cy="6858000"/>
+          </a:xfrm>
+          <a:prstGeom prst="rect">
+            <a:avLst/>
+          </a:prstGeom>
+        </p:spPr>
+      </p:pic>
+      <p:sp>
+        <p:nvSpPr>
+          <p:cNvPr id="10" name="Title 9">
+            <a:extLst>
+              <a:ext uri="{FF2B5EF4-FFF2-40B4-BE49-F238E27FC236}">
+                <a16:creationId xmlns:a16="http://schemas.microsoft.com/office/drawing/2014/main" id="{3526F5F4-3C84-4A1F-801F-564C06D3327D}"/>
+              </a:ext>
+            </a:extLst>
+          </p:cNvPr>
+          <p:cNvSpPr>
+            <a:spLocks noGrp="1"/>
+          </p:cNvSpPr>
+          <p:nvPr>
+            <p:ph type="title"/>
+          </p:nvPr>
+        </p:nvSpPr>
+        <p:spPr>
+          <a:xfrm>
+            <a:off x="1179226" y="826680"/>
+            <a:ext cx="9833548" cy="1325563"/>
+          </a:xfrm>
+        </p:spPr>
+        <p:txBody>
+          <a:bodyPr>
+            <a:normAutofit/>
+          </a:bodyPr>
+          <a:lstStyle/>
+          <a:p>
+            <a:pPr algn="ctr"/>
+            <a:r>
+              <a:rPr lang="en-US" sz="4000" dirty="0">
+                <a:solidFill>
+                  <a:srgbClr val="FFFFFF"/>
+                </a:solidFill>
+              </a:rPr>
+              <a:t>Graphics Q3</a:t>
+            </a:r>
+          </a:p>
+        </p:txBody>
+      </p:sp>
+      <p:pic>
+        <p:nvPicPr>
+          <p:cNvPr id="3" name="Picture 2">
+            <a:extLst>
+              <a:ext uri="{FF2B5EF4-FFF2-40B4-BE49-F238E27FC236}">
+                <a16:creationId xmlns:a16="http://schemas.microsoft.com/office/drawing/2014/main" id="{F772D109-1384-403A-8BAA-5FF555402916}"/>
+              </a:ext>
+            </a:extLst>
+          </p:cNvPr>
+          <p:cNvPicPr>
+            <a:picLocks noChangeAspect="1" noChangeArrowheads="1"/>
+          </p:cNvPicPr>
+          <p:nvPr/>
+        </p:nvPicPr>
+        <p:blipFill>
+          <a:blip r:embed="rId3">
+            <a:extLst>
+              <a:ext uri="{28A0092B-C50C-407E-A947-70E740481C1C}">
+                <a14:useLocalDpi xmlns:a14="http://schemas.microsoft.com/office/drawing/2010/main" val="0"/>
+              </a:ext>
+            </a:extLst>
+          </a:blip>
+          <a:srcRect/>
+          <a:stretch>
+            <a:fillRect/>
+          </a:stretch>
+        </p:blipFill>
+        <p:spPr bwMode="auto">
+          <a:xfrm>
+            <a:off x="912798" y="2531165"/>
+            <a:ext cx="10366099" cy="3805777"/>
+          </a:xfrm>
+          <a:prstGeom prst="rect">
+            <a:avLst/>
+          </a:prstGeom>
+          <a:noFill/>
+          <a:extLst>
+            <a:ext uri="{909E8E84-426E-40DD-AFC4-6F175D3DCCD1}">
+              <a14:hiddenFill xmlns:a14="http://schemas.microsoft.com/office/drawing/2010/main">
+                <a:solidFill>
+                  <a:srgbClr val="FFFFFF"/>
+                </a:solidFill>
+              </a14:hiddenFill>
+            </a:ext>
+          </a:extLst>
+        </p:spPr>
+      </p:pic>
+    </p:spTree>
+    <p:extLst>
+      <p:ext uri="{BB962C8B-B14F-4D97-AF65-F5344CB8AC3E}">
+        <p14:creationId xmlns:p14="http://schemas.microsoft.com/office/powerpoint/2010/main" val="1316218819"/>
+      </p:ext>
+    </p:extLst>
+  </p:cSld>
+  <p:clrMapOvr>
+    <a:masterClrMapping/>
+  </p:clrMapOvr>
+</p:sld>
+</file>
+
+<file path=ppt/slides/slide13.xml><?xml version="1.0" encoding="utf-8"?>
+<p:sld xmlns:a="http://schemas.openxmlformats.org/drawingml/2006/main" xmlns:r="http://schemas.openxmlformats.org/officeDocument/2006/relationships" xmlns:p="http://schemas.openxmlformats.org/presentationml/2006/main">
+  <p:cSld>
+    <p:bg>
+      <p:bgPr>
+        <a:solidFill>
+          <a:schemeClr val="bg1"/>
+        </a:solidFill>
+        <a:effectLst/>
+      </p:bgPr>
+    </p:bg>
+    <p:spTree>
+      <p:nvGrpSpPr>
+        <p:cNvPr id="1" name=""/>
+        <p:cNvGrpSpPr/>
+        <p:nvPr/>
+      </p:nvGrpSpPr>
+      <p:grpSpPr>
+        <a:xfrm>
+          <a:off x="0" y="0"/>
+          <a:ext cx="0" cy="0"/>
+          <a:chOff x="0" y="0"/>
+          <a:chExt cx="0" cy="0"/>
+        </a:xfrm>
+      </p:grpSpPr>
+      <p:sp>
+        <p:nvSpPr>
+          <p:cNvPr id="8" name="Rectangle 7">
+            <a:extLst>
+              <a:ext uri="{FF2B5EF4-FFF2-40B4-BE49-F238E27FC236}">
+                <a16:creationId xmlns:a16="http://schemas.microsoft.com/office/drawing/2014/main" id="{4351DFE5-F63D-4BE0-BDA9-E3EB88F01AA5}"/>
+              </a:ext>
+              <a:ext uri="{C183D7F6-B498-43B3-948B-1728B52AA6E4}">
+                <adec:decorative xmlns:adec="http://schemas.microsoft.com/office/drawing/2017/decorative" val="1"/>
+              </a:ext>
+            </a:extLst>
+          </p:cNvPr>
+          <p:cNvSpPr>
+            <a:spLocks noGrp="1" noRot="1" noChangeAspect="1" noMove="1" noResize="1" noEditPoints="1" noAdjustHandles="1" noChangeArrowheads="1" noChangeShapeType="1" noTextEdit="1"/>
+          </p:cNvSpPr>
+          <p:nvPr>
+            <p:extLst>
+              <p:ext uri="{386F3935-93C4-4BCD-93E2-E3B085C9AB24}">
+                <p16:designElem xmlns:p16="http://schemas.microsoft.com/office/powerpoint/2015/main" val="1"/>
+              </p:ext>
+            </p:extLst>
+          </p:nvPr>
+        </p:nvSpPr>
+        <p:spPr>
+          <a:xfrm>
+            <a:off x="355601" y="0"/>
+            <a:ext cx="11480494" cy="2753936"/>
+          </a:xfrm>
+          <a:prstGeom prst="rect">
+            <a:avLst/>
+          </a:prstGeom>
+          <a:gradFill>
+            <a:gsLst>
+              <a:gs pos="0">
+                <a:schemeClr val="accent1">
+                  <a:lumMod val="90000"/>
+                </a:schemeClr>
+              </a:gs>
+              <a:gs pos="25000">
+                <a:schemeClr val="accent1">
+                  <a:lumMod val="90000"/>
+                </a:schemeClr>
+              </a:gs>
+              <a:gs pos="94000">
+                <a:schemeClr val="bg2">
+                  <a:lumMod val="25000"/>
+                </a:schemeClr>
+              </a:gs>
+              <a:gs pos="100000">
+                <a:schemeClr val="bg2">
+                  <a:lumMod val="25000"/>
+                </a:schemeClr>
+              </a:gs>
+            </a:gsLst>
+            <a:lin ang="4200000" scaled="0"/>
+          </a:gradFill>
+          <a:ln>
+            <a:noFill/>
+          </a:ln>
+        </p:spPr>
+        <p:style>
+          <a:lnRef idx="2">
+            <a:schemeClr val="accent1">
+              <a:shade val="50000"/>
+            </a:schemeClr>
+          </a:lnRef>
+          <a:fillRef idx="1">
+            <a:schemeClr val="accent1"/>
+          </a:fillRef>
+          <a:effectRef idx="0">
+            <a:schemeClr val="accent1"/>
+          </a:effectRef>
+          <a:fontRef idx="minor">
+            <a:schemeClr val="lt1"/>
+          </a:fontRef>
+        </p:style>
+        <p:txBody>
+          <a:bodyPr rtlCol="0" anchor="ctr"/>
+          <a:lstStyle/>
+          <a:p>
+            <a:pPr algn="ctr"/>
+            <a:endParaRPr lang="en-US"/>
+          </a:p>
+        </p:txBody>
+      </p:sp>
+      <p:pic>
+        <p:nvPicPr>
+          <p:cNvPr id="10" name="Picture 9">
+            <a:extLst>
+              <a:ext uri="{FF2B5EF4-FFF2-40B4-BE49-F238E27FC236}">
+                <a16:creationId xmlns:a16="http://schemas.microsoft.com/office/drawing/2014/main" id="{3AA16612-ACD2-4A16-8F2B-4514FD6BF28F}"/>
+              </a:ext>
+              <a:ext uri="{C183D7F6-B498-43B3-948B-1728B52AA6E4}">
+                <adec:decorative xmlns:adec="http://schemas.microsoft.com/office/drawing/2017/decorative" val="1"/>
+              </a:ext>
+            </a:extLst>
+          </p:cNvPr>
+          <p:cNvPicPr>
+            <a:picLocks noGrp="1" noRot="1" noChangeAspect="1" noMove="1" noResize="1" noEditPoints="1" noAdjustHandles="1" noChangeArrowheads="1" noChangeShapeType="1" noCrop="1"/>
+          </p:cNvPicPr>
+          <p:nvPr>
+            <p:extLst>
+              <p:ext uri="{386F3935-93C4-4BCD-93E2-E3B085C9AB24}">
+                <p16:designElem xmlns:p16="http://schemas.microsoft.com/office/powerpoint/2015/main" val="1"/>
+              </p:ext>
+            </p:extLst>
+          </p:nvPr>
+        </p:nvPicPr>
+        <p:blipFill>
+          <a:blip r:embed="rId2">
+            <a:extLst>
+              <a:ext uri="{28A0092B-C50C-407E-A947-70E740481C1C}">
+                <a14:useLocalDpi xmlns:a14="http://schemas.microsoft.com/office/drawing/2010/main" val="0"/>
+              </a:ext>
+            </a:extLst>
+          </a:blip>
+          <a:stretch>
+            <a:fillRect/>
+          </a:stretch>
+        </p:blipFill>
+        <p:spPr>
+          <a:xfrm>
+            <a:off x="0" y="0"/>
+            <a:ext cx="12192000" cy="6858000"/>
+          </a:xfrm>
+          <a:prstGeom prst="rect">
+            <a:avLst/>
+          </a:prstGeom>
+        </p:spPr>
+      </p:pic>
+      <p:sp>
+        <p:nvSpPr>
+          <p:cNvPr id="2" name="Title 1">
+            <a:extLst>
+              <a:ext uri="{FF2B5EF4-FFF2-40B4-BE49-F238E27FC236}">
                 <a16:creationId xmlns:a16="http://schemas.microsoft.com/office/drawing/2014/main" id="{637F08C2-8BBC-4F25-A2C6-C28591BCDC3A}"/>
               </a:ext>
             </a:extLst>
@@ -5240,19 +6171,17 @@
       </p:sp>
       <p:pic>
         <p:nvPicPr>
-          <p:cNvPr id="2050" name="Picture 2">
-            <a:extLst>
-              <a:ext uri="{FF2B5EF4-FFF2-40B4-BE49-F238E27FC236}">
-                <a16:creationId xmlns:a16="http://schemas.microsoft.com/office/drawing/2014/main" id="{9EB391EA-DA07-4AAD-919B-D1C40A45EB84}"/>
+          <p:cNvPr id="2052" name="Picture 4">
+            <a:extLst>
+              <a:ext uri="{FF2B5EF4-FFF2-40B4-BE49-F238E27FC236}">
+                <a16:creationId xmlns:a16="http://schemas.microsoft.com/office/drawing/2014/main" id="{17AD119A-226E-4221-BFE6-727166AED2ED}"/>
               </a:ext>
             </a:extLst>
           </p:cNvPr>
           <p:cNvPicPr>
-            <a:picLocks noGrp="1" noChangeAspect="1" noChangeArrowheads="1"/>
+            <a:picLocks noChangeAspect="1" noChangeArrowheads="1"/>
           </p:cNvPicPr>
-          <p:nvPr>
-            <p:ph idx="1"/>
-          </p:nvPr>
+          <p:nvPr/>
         </p:nvPicPr>
         <p:blipFill>
           <a:blip r:embed="rId3">
@@ -5269,8 +6198,8 @@
         </p:blipFill>
         <p:spPr bwMode="auto">
           <a:xfrm>
-            <a:off x="1010588" y="3253357"/>
-            <a:ext cx="3769644" cy="2693988"/>
+            <a:off x="6633503" y="3276376"/>
+            <a:ext cx="3705225" cy="2647950"/>
           </a:xfrm>
           <a:prstGeom prst="rect">
             <a:avLst/>
@@ -5287,53 +6216,39 @@
           </a:extLst>
         </p:spPr>
       </p:pic>
-      <p:pic>
-        <p:nvPicPr>
-          <p:cNvPr id="2052" name="Picture 4">
-            <a:extLst>
-              <a:ext uri="{FF2B5EF4-FFF2-40B4-BE49-F238E27FC236}">
-                <a16:creationId xmlns:a16="http://schemas.microsoft.com/office/drawing/2014/main" id="{17AD119A-226E-4221-BFE6-727166AED2ED}"/>
-              </a:ext>
-            </a:extLst>
-          </p:cNvPr>
-          <p:cNvPicPr>
-            <a:picLocks noChangeAspect="1" noChangeArrowheads="1"/>
-          </p:cNvPicPr>
-          <p:nvPr/>
-        </p:nvPicPr>
-        <p:blipFill>
-          <a:blip r:embed="rId4">
-            <a:extLst>
-              <a:ext uri="{28A0092B-C50C-407E-A947-70E740481C1C}">
-                <a14:useLocalDpi xmlns:a14="http://schemas.microsoft.com/office/drawing/2010/main" val="0"/>
-              </a:ext>
-            </a:extLst>
-          </a:blip>
-          <a:srcRect/>
-          <a:stretch>
-            <a:fillRect/>
-          </a:stretch>
-        </p:blipFill>
-        <p:spPr bwMode="auto">
-          <a:xfrm>
-            <a:off x="6633503" y="3276376"/>
-            <a:ext cx="3705225" cy="2647950"/>
-          </a:xfrm>
-          <a:prstGeom prst="rect">
-            <a:avLst/>
-          </a:prstGeom>
-          <a:noFill/>
-          <a:extLst>
-            <a:ext uri="{909E8E84-426E-40DD-AFC4-6F175D3DCCD1}">
-              <a14:hiddenFill xmlns:a14="http://schemas.microsoft.com/office/drawing/2010/main">
-                <a:solidFill>
-                  <a:srgbClr val="FFFFFF"/>
-                </a:solidFill>
-              </a14:hiddenFill>
-            </a:ext>
-          </a:extLst>
-        </p:spPr>
-      </p:pic>
+      <p:sp>
+        <p:nvSpPr>
+          <p:cNvPr id="2" name="Content Placeholder 1">
+            <a:extLst>
+              <a:ext uri="{FF2B5EF4-FFF2-40B4-BE49-F238E27FC236}">
+                <a16:creationId xmlns:a16="http://schemas.microsoft.com/office/drawing/2014/main" id="{8D142B04-4DB6-244C-BD26-B4C9039F297E}"/>
+              </a:ext>
+            </a:extLst>
+          </p:cNvPr>
+          <p:cNvSpPr>
+            <a:spLocks noGrp="1"/>
+          </p:cNvSpPr>
+          <p:nvPr>
+            <p:ph idx="1"/>
+          </p:nvPr>
+        </p:nvSpPr>
+        <p:spPr>
+          <a:xfrm>
+            <a:off x="828152" y="2943385"/>
+            <a:ext cx="4608007" cy="3725165"/>
+          </a:xfrm>
+        </p:spPr>
+        <p:txBody>
+          <a:bodyPr/>
+          <a:lstStyle/>
+          <a:p>
+            <a:r>
+              <a:rPr lang="en-US" dirty="0"/>
+              <a:t>Concussions appeared to go up after the movie was released</a:t>
+            </a:r>
+          </a:p>
+        </p:txBody>
+      </p:sp>
     </p:spTree>
     <p:extLst>
       <p:ext uri="{BB962C8B-B14F-4D97-AF65-F5344CB8AC3E}">
@@ -5877,7 +6792,7 @@
                   <a:srgbClr val="FFFFFF"/>
                 </a:solidFill>
               </a:rPr>
-              <a:t>Question 3</a:t>
+              <a:t>Question 2</a:t>
             </a:r>
           </a:p>
         </p:txBody>
@@ -5911,87 +6826,37 @@
           <a:lstStyle/>
           <a:p>
             <a:r>
-              <a:rPr lang="en-US" sz="2000" b="0" i="0" dirty="0">
-                <a:solidFill>
-                  <a:srgbClr val="24292E"/>
-                </a:solidFill>
-                <a:effectLst/>
-                <a:latin typeface="-apple-system"/>
-              </a:rPr>
-              <a:t>Is there a certain time of year that has more concussions occur?</a:t>
-            </a:r>
-          </a:p>
-          <a:p>
-            <a:pPr algn="l">
-              <a:buFont typeface="Arial" panose="020B0604020202020204" pitchFamily="34" charset="0"/>
-              <a:buChar char="•"/>
-            </a:pPr>
-            <a:r>
-              <a:rPr lang="en-US" sz="2000" b="0" i="0" dirty="0">
-                <a:solidFill>
-                  <a:srgbClr val="24292E"/>
-                </a:solidFill>
-                <a:effectLst/>
-                <a:latin typeface="-apple-system"/>
-              </a:rPr>
-              <a:t>Alt: If the time of year affects concussions, then there will be more concussions during a certain part of the season.</a:t>
-            </a:r>
-          </a:p>
-          <a:p>
-            <a:pPr algn="l">
-              <a:buFont typeface="Arial" panose="020B0604020202020204" pitchFamily="34" charset="0"/>
-              <a:buChar char="•"/>
-            </a:pPr>
-            <a:r>
-              <a:rPr lang="en-US" sz="2000" b="0" i="0" dirty="0">
-                <a:solidFill>
-                  <a:srgbClr val="24292E"/>
-                </a:solidFill>
-                <a:effectLst/>
-                <a:latin typeface="-apple-system"/>
-              </a:rPr>
-              <a:t>Null: If the time of year does not affect concussions, then there will not be more concussions during a certain part of the season.</a:t>
-            </a:r>
-          </a:p>
-          <a:p>
-            <a:pPr algn="l">
-              <a:buFont typeface="Arial" panose="020B0604020202020204" pitchFamily="34" charset="0"/>
-              <a:buChar char="•"/>
-            </a:pPr>
-            <a:r>
-              <a:rPr lang="en-US" sz="2000" dirty="0">
+              <a:rPr lang="en-US" sz="2400" dirty="0">
                 <a:solidFill>
                   <a:srgbClr val="24292E"/>
                 </a:solidFill>
                 <a:latin typeface="-apple-system"/>
               </a:rPr>
-              <a:t>T Test=  3.215721636354374</a:t>
-            </a:r>
-          </a:p>
-          <a:p>
-            <a:pPr algn="l">
-              <a:buFont typeface="Arial" panose="020B0604020202020204" pitchFamily="34" charset="0"/>
-              <a:buChar char="•"/>
-            </a:pPr>
-            <a:r>
-              <a:rPr lang="en-US" sz="2000" b="0" i="0" dirty="0" err="1">
+              <a:t>Did rule changes in 2018 affect all injuries or just concussions?</a:t>
+            </a:r>
+          </a:p>
+          <a:p>
+            <a:pPr lvl="1"/>
+            <a:r>
+              <a:rPr lang="en-US" sz="1800" dirty="0">
                 <a:solidFill>
                   <a:srgbClr val="24292E"/>
                 </a:solidFill>
-                <a:effectLst/>
                 <a:latin typeface="-apple-system"/>
               </a:rPr>
-              <a:t>Pvalue</a:t>
-            </a:r>
-            <a:r>
-              <a:rPr lang="en-US" sz="2000" b="0" i="0" dirty="0">
+              <a:t>Alt: If injuries were affected by rule changes, then injuries would go down.</a:t>
+            </a:r>
+          </a:p>
+          <a:p>
+            <a:pPr lvl="1"/>
+            <a:r>
+              <a:rPr lang="en-US" sz="1800" dirty="0">
                 <a:solidFill>
                   <a:srgbClr val="24292E"/>
                 </a:solidFill>
-                <a:effectLst/>
                 <a:latin typeface="-apple-system"/>
               </a:rPr>
-              <a:t>= 0.00019897702695319134</a:t>
+              <a:t>Null: If injuries were not affected by rule changes, then injuries would not go down.</a:t>
             </a:r>
           </a:p>
           <a:p>
@@ -6009,7 +6874,7 @@
     </p:spTree>
     <p:extLst>
       <p:ext uri="{BB962C8B-B14F-4D97-AF65-F5344CB8AC3E}">
-        <p14:creationId xmlns:p14="http://schemas.microsoft.com/office/powerpoint/2010/main" val="2152812155"/>
+        <p14:creationId xmlns:p14="http://schemas.microsoft.com/office/powerpoint/2010/main" val="2456488472"/>
       </p:ext>
     </p:extLst>
   </p:cSld>
@@ -6046,7 +6911,7 @@
       </p:grpSpPr>
       <p:sp>
         <p:nvSpPr>
-          <p:cNvPr id="17" name="Rectangle 16">
+          <p:cNvPr id="8" name="Rectangle 7">
             <a:extLst>
               <a:ext uri="{FF2B5EF4-FFF2-40B4-BE49-F238E27FC236}">
                 <a16:creationId xmlns:a16="http://schemas.microsoft.com/office/drawing/2014/main" id="{4351DFE5-F63D-4BE0-BDA9-E3EB88F01AA5}"/>
@@ -6131,7 +6996,7 @@
       </p:sp>
       <p:pic>
         <p:nvPicPr>
-          <p:cNvPr id="19" name="Picture 18">
+          <p:cNvPr id="10" name="Picture 9">
             <a:extLst>
               <a:ext uri="{FF2B5EF4-FFF2-40B4-BE49-F238E27FC236}">
                 <a16:creationId xmlns:a16="http://schemas.microsoft.com/office/drawing/2014/main" id="{3AA16612-ACD2-4A16-8F2B-4514FD6BF28F}"/>
@@ -6176,10 +7041,10 @@
       </p:pic>
       <p:sp>
         <p:nvSpPr>
-          <p:cNvPr id="10" name="Title 9">
-            <a:extLst>
-              <a:ext uri="{FF2B5EF4-FFF2-40B4-BE49-F238E27FC236}">
-                <a16:creationId xmlns:a16="http://schemas.microsoft.com/office/drawing/2014/main" id="{3526F5F4-3C84-4A1F-801F-564C06D3327D}"/>
+          <p:cNvPr id="2" name="Title 1">
+            <a:extLst>
+              <a:ext uri="{FF2B5EF4-FFF2-40B4-BE49-F238E27FC236}">
+                <a16:creationId xmlns:a16="http://schemas.microsoft.com/office/drawing/2014/main" id="{23F221A8-1670-4451-9180-D4F98B496DDB}"/>
               </a:ext>
             </a:extLst>
           </p:cNvPr>
@@ -6202,31 +7067,158 @@
           </a:bodyPr>
           <a:lstStyle/>
           <a:p>
-            <a:pPr algn="ctr"/>
+            <a:pPr marR="0" lvl="0" algn="ctr" defTabSz="914400" rtl="0" eaLnBrk="1" fontAlgn="auto" latinLnBrk="0" hangingPunct="1">
+              <a:lnSpc>
+                <a:spcPct val="90000"/>
+              </a:lnSpc>
+              <a:spcBef>
+                <a:spcPts val="1000"/>
+              </a:spcBef>
+              <a:spcAft>
+                <a:spcPts val="0"/>
+              </a:spcAft>
+              <a:buClrTx/>
+              <a:buSzTx/>
+              <a:tabLst/>
+              <a:defRPr/>
+            </a:pPr>
             <a:r>
               <a:rPr lang="en-US" sz="4000" dirty="0">
                 <a:solidFill>
                   <a:srgbClr val="FFFFFF"/>
                 </a:solidFill>
               </a:rPr>
-              <a:t>Graphics Q3</a:t>
-            </a:r>
+              <a:t>Question 2</a:t>
+            </a:r>
+          </a:p>
+        </p:txBody>
+      </p:sp>
+      <p:sp>
+        <p:nvSpPr>
+          <p:cNvPr id="6" name="TextBox 5">
+            <a:extLst>
+              <a:ext uri="{FF2B5EF4-FFF2-40B4-BE49-F238E27FC236}">
+                <a16:creationId xmlns:a16="http://schemas.microsoft.com/office/drawing/2014/main" id="{050CA433-B61A-114E-A358-EE5D2F4032AF}"/>
+              </a:ext>
+            </a:extLst>
+          </p:cNvPr>
+          <p:cNvSpPr txBox="1"/>
+          <p:nvPr/>
+        </p:nvSpPr>
+        <p:spPr>
+          <a:xfrm>
+            <a:off x="1085222" y="3265714"/>
+            <a:ext cx="4461468" cy="2031325"/>
+          </a:xfrm>
+          <a:prstGeom prst="rect">
+            <a:avLst/>
+          </a:prstGeom>
+          <a:noFill/>
+        </p:spPr>
+        <p:txBody>
+          <a:bodyPr wrap="square" rtlCol="0">
+            <a:spAutoFit/>
+          </a:bodyPr>
+          <a:lstStyle/>
+          <a:p>
+            <a:pPr marL="285750" indent="-285750">
+              <a:buFont typeface="Arial" panose="020B0604020202020204" pitchFamily="34" charset="0"/>
+              <a:buChar char="•"/>
+            </a:pPr>
+            <a:r>
+              <a:rPr lang="en-US" dirty="0"/>
+              <a:t>Injuries went up in 2016, and did not decrease in 2018 with the implementation of new rules such as targeting</a:t>
+            </a:r>
+          </a:p>
+          <a:p>
+            <a:pPr marL="285750" indent="-285750">
+              <a:buFont typeface="Arial" panose="020B0604020202020204" pitchFamily="34" charset="0"/>
+              <a:buChar char="•"/>
+            </a:pPr>
+            <a:endParaRPr lang="en-US" dirty="0">
+              <a:solidFill>
+                <a:srgbClr val="24292E"/>
+              </a:solidFill>
+              <a:latin typeface="-apple-system"/>
+            </a:endParaRPr>
+          </a:p>
+          <a:p>
+            <a:pPr marL="285750" indent="-285750">
+              <a:buFont typeface="Arial" panose="020B0604020202020204" pitchFamily="34" charset="0"/>
+              <a:buChar char="•"/>
+            </a:pPr>
+            <a:r>
+              <a:rPr lang="en-US" dirty="0">
+                <a:solidFill>
+                  <a:srgbClr val="24292E"/>
+                </a:solidFill>
+                <a:latin typeface="-apple-system"/>
+              </a:rPr>
+              <a:t>T-test: </a:t>
+            </a:r>
+            <a:r>
+              <a:rPr lang="en-US" dirty="0"/>
+              <a:t>-2.374087</a:t>
+            </a:r>
+          </a:p>
+          <a:p>
+            <a:pPr marL="285750" indent="-285750">
+              <a:buFont typeface="Arial" panose="020B0604020202020204" pitchFamily="34" charset="0"/>
+              <a:buChar char="•"/>
+            </a:pPr>
+            <a:r>
+              <a:rPr lang="en-US" dirty="0" err="1">
+                <a:solidFill>
+                  <a:srgbClr val="24292E"/>
+                </a:solidFill>
+                <a:latin typeface="-apple-system"/>
+              </a:rPr>
+              <a:t>Pvalue</a:t>
+            </a:r>
+            <a:r>
+              <a:rPr lang="en-US" dirty="0">
+                <a:solidFill>
+                  <a:srgbClr val="24292E"/>
+                </a:solidFill>
+                <a:latin typeface="-apple-system"/>
+              </a:rPr>
+              <a:t>: </a:t>
+            </a:r>
+            <a:r>
+              <a:rPr lang="en-US" dirty="0"/>
+              <a:t>0.06362946</a:t>
+            </a:r>
+            <a:endParaRPr lang="en-US" dirty="0">
+              <a:solidFill>
+                <a:srgbClr val="24292E"/>
+              </a:solidFill>
+              <a:latin typeface="-apple-system"/>
+            </a:endParaRPr>
+          </a:p>
+          <a:p>
+            <a:pPr marL="285750" indent="-285750">
+              <a:buFont typeface="Arial" panose="020B0604020202020204" pitchFamily="34" charset="0"/>
+              <a:buChar char="•"/>
+            </a:pPr>
+            <a:endParaRPr lang="en-US" dirty="0"/>
           </a:p>
         </p:txBody>
       </p:sp>
       <p:pic>
         <p:nvPicPr>
-          <p:cNvPr id="3" name="Picture 2">
-            <a:extLst>
-              <a:ext uri="{FF2B5EF4-FFF2-40B4-BE49-F238E27FC236}">
-                <a16:creationId xmlns:a16="http://schemas.microsoft.com/office/drawing/2014/main" id="{F772D109-1384-403A-8BAA-5FF555402916}"/>
+          <p:cNvPr id="13" name="Content Placeholder 12">
+            <a:extLst>
+              <a:ext uri="{FF2B5EF4-FFF2-40B4-BE49-F238E27FC236}">
+                <a16:creationId xmlns:a16="http://schemas.microsoft.com/office/drawing/2014/main" id="{6C5622FD-8F09-3F4D-AF7B-DDED5A9D17CF}"/>
               </a:ext>
             </a:extLst>
           </p:cNvPr>
           <p:cNvPicPr>
-            <a:picLocks noChangeAspect="1" noChangeArrowheads="1"/>
+            <a:picLocks noGrp="1" noChangeAspect="1"/>
           </p:cNvPicPr>
-          <p:nvPr/>
+          <p:nvPr>
+            <p:ph idx="1"/>
+          </p:nvPr>
         </p:nvPicPr>
         <p:blipFill>
           <a:blip r:embed="rId3">
@@ -6236,35 +7228,21 @@
               </a:ext>
             </a:extLst>
           </a:blip>
-          <a:srcRect/>
           <a:stretch>
             <a:fillRect/>
           </a:stretch>
         </p:blipFill>
-        <p:spPr bwMode="auto">
-          <a:xfrm>
-            <a:off x="912798" y="2531165"/>
-            <a:ext cx="10366099" cy="3805777"/>
-          </a:xfrm>
-          <a:prstGeom prst="rect">
-            <a:avLst/>
-          </a:prstGeom>
-          <a:noFill/>
-          <a:extLst>
-            <a:ext uri="{909E8E84-426E-40DD-AFC4-6F175D3DCCD1}">
-              <a14:hiddenFill xmlns:a14="http://schemas.microsoft.com/office/drawing/2010/main">
-                <a:solidFill>
-                  <a:srgbClr val="FFFFFF"/>
-                </a:solidFill>
-              </a14:hiddenFill>
-            </a:ext>
-          </a:extLst>
+        <p:spPr>
+          <a:xfrm>
+            <a:off x="5902291" y="2753936"/>
+            <a:ext cx="5486400" cy="3657600"/>
+          </a:xfrm>
         </p:spPr>
       </p:pic>
     </p:spTree>
     <p:extLst>
       <p:ext uri="{BB962C8B-B14F-4D97-AF65-F5344CB8AC3E}">
-        <p14:creationId xmlns:p14="http://schemas.microsoft.com/office/powerpoint/2010/main" val="1316218819"/>
+        <p14:creationId xmlns:p14="http://schemas.microsoft.com/office/powerpoint/2010/main" val="3102473885"/>
       </p:ext>
     </p:extLst>
   </p:cSld>

</xml_diff>